<commit_message>
heel veel van vandaag
</commit_message>
<xml_diff>
--- a/presentatie/plaatjes.pptx
+++ b/presentatie/plaatjes.pptx
@@ -5,10 +5,10 @@
     <p:sldMasterId id="2147483720" r:id="rId4"/>
   </p:sldMasterIdLst>
   <p:notesMasterIdLst>
-    <p:notesMasterId r:id="rId13"/>
+    <p:notesMasterId r:id="rId14"/>
   </p:notesMasterIdLst>
   <p:handoutMasterIdLst>
-    <p:handoutMasterId r:id="rId14"/>
+    <p:handoutMasterId r:id="rId15"/>
   </p:handoutMasterIdLst>
   <p:sldIdLst>
     <p:sldId id="259" r:id="rId5"/>
@@ -19,6 +19,7 @@
     <p:sldId id="264" r:id="rId10"/>
     <p:sldId id="265" r:id="rId11"/>
     <p:sldId id="266" r:id="rId12"/>
+    <p:sldId id="267" r:id="rId13"/>
   </p:sldIdLst>
   <p:sldSz cx="12188825" cy="6858000"/>
   <p:notesSz cx="6858000" cy="9144000"/>
@@ -259,7 +260,7 @@
             <a:pPr rtl="0"/>
             <a:fld id="{3A6FBF1E-C4F2-4243-9DC6-F239D845E59F}" type="datetime1">
               <a:rPr lang="nl-NL" smtClean="0"/>
-              <a:t>10-10-2018</a:t>
+              <a:t>16-10-2018</a:t>
             </a:fld>
             <a:endParaRPr lang="nl-NL" dirty="0"/>
           </a:p>
@@ -327,7 +328,7 @@
             <a:pPr rtl="0"/>
             <a:fld id="{04360E59-1627-4404-ACC5-51C744AB0F27}" type="slidenum">
               <a:rPr lang="nl-NL" smtClean="0"/>
-              <a:t>‹#›</a:t>
+              <a:t>‹nr.›</a:t>
             </a:fld>
             <a:endParaRPr lang="nl-NL" dirty="0"/>
           </a:p>
@@ -436,7 +437,7 @@
             <a:fld id="{4B7914FC-CF06-4AB5-AD3F-8E162DDC032C}" type="datetime1">
               <a:rPr lang="nl-NL" smtClean="0"/>
               <a:pPr/>
-              <a:t>10-10-2018</a:t>
+              <a:t>16-10-2018</a:t>
             </a:fld>
             <a:endParaRPr lang="nl-NL" dirty="0"/>
           </a:p>
@@ -606,7 +607,7 @@
             <a:fld id="{841221E5-7225-48EB-A4EE-420E7BFCF705}" type="slidenum">
               <a:rPr lang="nl-NL" noProof="0" smtClean="0"/>
               <a:pPr rtl="0"/>
-              <a:t>‹#›</a:t>
+              <a:t>‹nr.›</a:t>
             </a:fld>
             <a:endParaRPr lang="nl-NL" noProof="0" dirty="0"/>
           </a:p>
@@ -934,7 +935,7 @@
             <a:pPr rtl="0"/>
             <a:fld id="{5BE58D0C-B18C-4E45-B9D5-64B93015D0F3}" type="datetime1">
               <a:rPr lang="nl-NL" noProof="0" smtClean="0"/>
-              <a:t>10-10-2018</a:t>
+              <a:t>16-10-2018</a:t>
             </a:fld>
             <a:endParaRPr lang="nl-NL" noProof="0" dirty="0"/>
           </a:p>
@@ -983,7 +984,7 @@
             <a:fld id="{7DC1BBB0-96F0-4077-A278-0F3FB5C104D3}" type="slidenum">
               <a:rPr lang="nl-NL" noProof="0" smtClean="0"/>
               <a:pPr rtl="0"/>
-              <a:t>‹#›</a:t>
+              <a:t>‹nr.›</a:t>
             </a:fld>
             <a:endParaRPr lang="nl-NL" noProof="0" dirty="0"/>
           </a:p>
@@ -1124,7 +1125,7 @@
             <a:pPr rtl="0"/>
             <a:fld id="{DEEB18D8-77BC-425C-AF0A-16DB76946B9E}" type="datetime1">
               <a:rPr lang="nl-NL" noProof="0" smtClean="0"/>
-              <a:t>10-10-2018</a:t>
+              <a:t>16-10-2018</a:t>
             </a:fld>
             <a:endParaRPr lang="nl-NL" noProof="0" dirty="0"/>
           </a:p>
@@ -1172,7 +1173,7 @@
             <a:pPr rtl="0"/>
             <a:fld id="{7DC1BBB0-96F0-4077-A278-0F3FB5C104D3}" type="slidenum">
               <a:rPr lang="nl-NL" noProof="0" smtClean="0"/>
-              <a:t>‹#›</a:t>
+              <a:t>‹nr.›</a:t>
             </a:fld>
             <a:endParaRPr lang="nl-NL" noProof="0" dirty="0"/>
           </a:p>
@@ -1323,7 +1324,7 @@
             <a:pPr rtl="0"/>
             <a:fld id="{29970CB2-6E4B-4EFE-B0F6-784A8BFA68C0}" type="datetime1">
               <a:rPr lang="nl-NL" noProof="0" smtClean="0"/>
-              <a:t>10-10-2018</a:t>
+              <a:t>16-10-2018</a:t>
             </a:fld>
             <a:endParaRPr lang="nl-NL" noProof="0" dirty="0"/>
           </a:p>
@@ -1371,7 +1372,7 @@
             <a:pPr rtl="0"/>
             <a:fld id="{7DC1BBB0-96F0-4077-A278-0F3FB5C104D3}" type="slidenum">
               <a:rPr lang="nl-NL" noProof="0" smtClean="0"/>
-              <a:t>‹#›</a:t>
+              <a:t>‹nr.›</a:t>
             </a:fld>
             <a:endParaRPr lang="nl-NL" noProof="0" dirty="0"/>
           </a:p>
@@ -1512,7 +1513,7 @@
             <a:pPr rtl="0"/>
             <a:fld id="{A330C59B-4812-4B35-9A8F-1CC0C645D246}" type="datetime1">
               <a:rPr lang="nl-NL" noProof="0" smtClean="0"/>
-              <a:t>10-10-2018</a:t>
+              <a:t>16-10-2018</a:t>
             </a:fld>
             <a:endParaRPr lang="nl-NL" noProof="0" dirty="0"/>
           </a:p>
@@ -1561,7 +1562,7 @@
             <a:fld id="{7DC1BBB0-96F0-4077-A278-0F3FB5C104D3}" type="slidenum">
               <a:rPr lang="nl-NL" noProof="0" smtClean="0"/>
               <a:pPr rtl="0"/>
-              <a:t>‹#›</a:t>
+              <a:t>‹nr.›</a:t>
             </a:fld>
             <a:endParaRPr lang="nl-NL" noProof="0" dirty="0"/>
           </a:p>
@@ -1767,7 +1768,7 @@
             <a:pPr rtl="0"/>
             <a:fld id="{D31A0523-37D0-4B74-AE8E-62ED3A51897B}" type="datetime1">
               <a:rPr lang="nl-NL" noProof="0" smtClean="0"/>
-              <a:t>10-10-2018</a:t>
+              <a:t>16-10-2018</a:t>
             </a:fld>
             <a:endParaRPr lang="nl-NL" noProof="0" dirty="0"/>
           </a:p>
@@ -1816,7 +1817,7 @@
             <a:fld id="{7DC1BBB0-96F0-4077-A278-0F3FB5C104D3}" type="slidenum">
               <a:rPr lang="nl-NL" noProof="0" smtClean="0"/>
               <a:pPr rtl="0"/>
-              <a:t>‹#›</a:t>
+              <a:t>‹nr.›</a:t>
             </a:fld>
             <a:endParaRPr lang="nl-NL" noProof="0" dirty="0"/>
           </a:p>
@@ -2019,7 +2020,7 @@
             <a:pPr rtl="0"/>
             <a:fld id="{25DC63D1-86E4-48D8-B161-F942E19FD40F}" type="datetime1">
               <a:rPr lang="nl-NL" noProof="0" smtClean="0"/>
-              <a:t>10-10-2018</a:t>
+              <a:t>16-10-2018</a:t>
             </a:fld>
             <a:endParaRPr lang="nl-NL" noProof="0" dirty="0"/>
           </a:p>
@@ -2067,7 +2068,7 @@
             <a:pPr rtl="0"/>
             <a:fld id="{7DC1BBB0-96F0-4077-A278-0F3FB5C104D3}" type="slidenum">
               <a:rPr lang="nl-NL" noProof="0" smtClean="0"/>
-              <a:t>‹#›</a:t>
+              <a:t>‹nr.›</a:t>
             </a:fld>
             <a:endParaRPr lang="nl-NL" noProof="0" dirty="0"/>
           </a:p>
@@ -2405,7 +2406,7 @@
             <a:pPr rtl="0"/>
             <a:fld id="{A866786B-1B0E-4D79-8012-342D473B0383}" type="datetime1">
               <a:rPr lang="nl-NL" noProof="0" smtClean="0"/>
-              <a:t>10-10-2018</a:t>
+              <a:t>16-10-2018</a:t>
             </a:fld>
             <a:endParaRPr lang="nl-NL" noProof="0" dirty="0"/>
           </a:p>
@@ -2453,7 +2454,7 @@
             <a:pPr rtl="0"/>
             <a:fld id="{7DC1BBB0-96F0-4077-A278-0F3FB5C104D3}" type="slidenum">
               <a:rPr lang="nl-NL" noProof="0" smtClean="0"/>
-              <a:t>‹#›</a:t>
+              <a:t>‹nr.›</a:t>
             </a:fld>
             <a:endParaRPr lang="nl-NL" noProof="0" dirty="0"/>
           </a:p>
@@ -2542,7 +2543,7 @@
             <a:pPr rtl="0"/>
             <a:fld id="{9479008A-7110-49D3-A08C-FC596D8713CB}" type="datetime1">
               <a:rPr lang="nl-NL" noProof="0" smtClean="0"/>
-              <a:t>10-10-2018</a:t>
+              <a:t>16-10-2018</a:t>
             </a:fld>
             <a:endParaRPr lang="nl-NL" noProof="0" dirty="0"/>
           </a:p>
@@ -2590,7 +2591,7 @@
             <a:pPr rtl="0"/>
             <a:fld id="{7DC1BBB0-96F0-4077-A278-0F3FB5C104D3}" type="slidenum">
               <a:rPr lang="nl-NL" noProof="0" smtClean="0"/>
-              <a:t>‹#›</a:t>
+              <a:t>‹nr.›</a:t>
             </a:fld>
             <a:endParaRPr lang="nl-NL" noProof="0" dirty="0"/>
           </a:p>
@@ -2656,7 +2657,7 @@
             <a:pPr rtl="0"/>
             <a:fld id="{B0980797-328D-4E1A-9313-2192C7581634}" type="datetime1">
               <a:rPr lang="nl-NL" noProof="0" smtClean="0"/>
-              <a:t>10-10-2018</a:t>
+              <a:t>16-10-2018</a:t>
             </a:fld>
             <a:endParaRPr lang="nl-NL" noProof="0" dirty="0"/>
           </a:p>
@@ -2705,7 +2706,7 @@
             <a:fld id="{7DC1BBB0-96F0-4077-A278-0F3FB5C104D3}" type="slidenum">
               <a:rPr lang="nl-NL" noProof="0" smtClean="0"/>
               <a:pPr rtl="0"/>
-              <a:t>‹#›</a:t>
+              <a:t>‹nr.›</a:t>
             </a:fld>
             <a:endParaRPr lang="nl-NL" noProof="0" dirty="0"/>
           </a:p>
@@ -2953,7 +2954,7 @@
             <a:pPr rtl="0"/>
             <a:fld id="{BE4C4D19-A41C-4D90-9236-CAB2851A3E19}" type="datetime1">
               <a:rPr lang="nl-NL" noProof="0" smtClean="0"/>
-              <a:t>10-10-2018</a:t>
+              <a:t>16-10-2018</a:t>
             </a:fld>
             <a:endParaRPr lang="nl-NL" noProof="0" dirty="0"/>
           </a:p>
@@ -3001,7 +3002,7 @@
             <a:pPr rtl="0"/>
             <a:fld id="{7DC1BBB0-96F0-4077-A278-0F3FB5C104D3}" type="slidenum">
               <a:rPr lang="nl-NL" noProof="0" smtClean="0"/>
-              <a:t>‹#›</a:t>
+              <a:t>‹nr.›</a:t>
             </a:fld>
             <a:endParaRPr lang="nl-NL" noProof="0" dirty="0"/>
           </a:p>
@@ -3225,7 +3226,7 @@
             <a:pPr rtl="0"/>
             <a:fld id="{BC29E7E8-5E92-42B7-BDEF-23F2BE794FA3}" type="datetime1">
               <a:rPr lang="nl-NL" noProof="0" smtClean="0"/>
-              <a:t>10-10-2018</a:t>
+              <a:t>16-10-2018</a:t>
             </a:fld>
             <a:endParaRPr lang="nl-NL" noProof="0" dirty="0"/>
           </a:p>
@@ -3273,7 +3274,7 @@
             <a:pPr rtl="0"/>
             <a:fld id="{7DC1BBB0-96F0-4077-A278-0F3FB5C104D3}" type="slidenum">
               <a:rPr lang="nl-NL" noProof="0" smtClean="0"/>
-              <a:t>‹#›</a:t>
+              <a:t>‹nr.›</a:t>
             </a:fld>
             <a:endParaRPr lang="nl-NL" noProof="0" dirty="0"/>
           </a:p>
@@ -3505,7 +3506,7 @@
             <a:pPr rtl="0"/>
             <a:fld id="{A330C59B-4812-4B35-9A8F-1CC0C645D246}" type="datetime1">
               <a:rPr lang="nl-NL" noProof="0" smtClean="0"/>
-              <a:t>10-10-2018</a:t>
+              <a:t>16-10-2018</a:t>
             </a:fld>
             <a:endParaRPr lang="nl-NL" noProof="0" dirty="0"/>
           </a:p>
@@ -3590,7 +3591,7 @@
             <a:fld id="{7DC1BBB0-96F0-4077-A278-0F3FB5C104D3}" type="slidenum">
               <a:rPr lang="nl-NL" noProof="0" smtClean="0"/>
               <a:pPr rtl="0"/>
-              <a:t>‹#›</a:t>
+              <a:t>‹nr.›</a:t>
             </a:fld>
             <a:endParaRPr lang="nl-NL" noProof="0" dirty="0"/>
           </a:p>
@@ -4445,7 +4446,7 @@
           <p:cNvPr id="2" name="Rectangle 1">
             <a:extLst>
               <a:ext uri="{FF2B5EF4-FFF2-40B4-BE49-F238E27FC236}">
-                <a16:creationId xmlns:a16="http://schemas.microsoft.com/office/drawing/2014/main" id="{9F326EE7-D4BC-4F17-86BE-15B273139D16}"/>
+                <a16:creationId xmlns:a16="http://schemas.microsoft.com/office/drawing/2014/main" xmlns="" id="{9F326EE7-D4BC-4F17-86BE-15B273139D16}"/>
               </a:ext>
             </a:extLst>
           </p:cNvPr>
@@ -4587,7 +4588,7 @@
               <a:rPr lang="en-US" dirty="0"/>
               <a:t>number 3: -0.3272824528296397 -0.5976133018857139 0.731945720309279</a:t>
             </a:r>
-            <a:endParaRPr lang="en-NL" dirty="0"/>
+            <a:endParaRPr lang="x-none" dirty="0"/>
           </a:p>
         </p:txBody>
       </p:sp>
@@ -4638,7 +4639,7 @@
           <p:cNvPr id="2" name="Rectangle 1">
             <a:extLst>
               <a:ext uri="{FF2B5EF4-FFF2-40B4-BE49-F238E27FC236}">
-                <a16:creationId xmlns:a16="http://schemas.microsoft.com/office/drawing/2014/main" id="{E1B25272-0DF4-4AEB-AF59-6E8AB4E1144D}"/>
+                <a16:creationId xmlns:a16="http://schemas.microsoft.com/office/drawing/2014/main" xmlns="" id="{E1B25272-0DF4-4AEB-AF59-6E8AB4E1144D}"/>
               </a:ext>
             </a:extLst>
           </p:cNvPr>
@@ -4670,109 +4671,109 @@
           </a:p>
           <a:p>
             <a:r>
-              <a:rPr lang="en-NL" dirty="0"/>
+              <a:rPr lang="x-none" dirty="0"/>
               <a:t>[[1.         0.62589092 0.63877069]</a:t>
             </a:r>
           </a:p>
           <a:p>
             <a:r>
-              <a:rPr lang="en-NL" dirty="0"/>
+              <a:rPr lang="x-none" dirty="0"/>
               <a:t> [0.62589092 1.         0.69326062]</a:t>
             </a:r>
           </a:p>
           <a:p>
             <a:r>
-              <a:rPr lang="en-NL" dirty="0"/>
+              <a:rPr lang="x-none" dirty="0"/>
               <a:t> [0.63877069 0.69326062 1.        ]]</a:t>
             </a:r>
           </a:p>
           <a:p>
             <a:r>
-              <a:rPr lang="en-NL" dirty="0"/>
+              <a:rPr lang="x-none" dirty="0"/>
               <a:t>eigenvalues:  [2.30572493+0.j 0.38824158+0.j 0.30603349+0.j]</a:t>
             </a:r>
           </a:p>
           <a:p>
             <a:r>
-              <a:rPr lang="en-NL" dirty="0"/>
+              <a:rPr lang="x-none" dirty="0"/>
               <a:t>Eigenvalue 1 =  2.30572492652982</a:t>
             </a:r>
           </a:p>
           <a:p>
             <a:r>
-              <a:rPr lang="en-NL" dirty="0"/>
+              <a:rPr lang="x-none" dirty="0"/>
               <a:t>Eigenvalue 2 =  0.3882415812665583</a:t>
             </a:r>
           </a:p>
           <a:p>
             <a:r>
-              <a:rPr lang="en-NL" dirty="0"/>
+              <a:rPr lang="x-none" dirty="0"/>
               <a:t>Eigenvalue 3 =  0.3060334922036205</a:t>
             </a:r>
           </a:p>
           <a:p>
             <a:r>
-              <a:rPr lang="en-NL" dirty="0"/>
+              <a:rPr lang="x-none" dirty="0"/>
               <a:t>Variance of total data:</a:t>
             </a:r>
           </a:p>
           <a:p>
             <a:r>
-              <a:rPr lang="en-NL" dirty="0"/>
+              <a:rPr lang="x-none" dirty="0"/>
               <a:t>Eigenvalue 1 =  76.857497550994</a:t>
             </a:r>
           </a:p>
           <a:p>
             <a:r>
-              <a:rPr lang="en-NL" dirty="0"/>
+              <a:rPr lang="x-none" dirty="0"/>
               <a:t>Eigenvalue 2 =  12.941386042218609</a:t>
             </a:r>
           </a:p>
           <a:p>
             <a:r>
-              <a:rPr lang="en-NL" dirty="0"/>
+              <a:rPr lang="x-none" dirty="0"/>
               <a:t>Eigenvalue 3 =  10.201116406787351</a:t>
             </a:r>
           </a:p>
           <a:p>
             <a:r>
-              <a:rPr lang="en-NL" dirty="0"/>
+              <a:rPr lang="x-none" dirty="0"/>
               <a:t>eigenvectors: </a:t>
             </a:r>
           </a:p>
           <a:p>
             <a:r>
-              <a:rPr lang="en-NL" dirty="0"/>
+              <a:rPr lang="x-none" dirty="0"/>
               <a:t>[[ 0.56506437  0.82142899 -0.07717944]</a:t>
             </a:r>
           </a:p>
           <a:p>
             <a:r>
-              <a:rPr lang="en-NL" dirty="0"/>
+              <a:rPr lang="x-none" dirty="0"/>
               <a:t> [ 0.58157296 -0.46291829 -0.66893912]</a:t>
             </a:r>
           </a:p>
           <a:p>
             <a:r>
-              <a:rPr lang="en-NL" dirty="0"/>
+              <a:rPr lang="x-none" dirty="0"/>
               <a:t> [ 0.58521376 -0.33310818  0.73929953]]</a:t>
             </a:r>
           </a:p>
           <a:p>
             <a:r>
-              <a:rPr lang="en-NL" dirty="0"/>
+              <a:rPr lang="x-none" dirty="0"/>
               <a:t>number 1: 0.5650643708906329 0.5815729647028391 0.585213758789661</a:t>
             </a:r>
           </a:p>
           <a:p>
             <a:r>
-              <a:rPr lang="en-NL" dirty="0"/>
+              <a:rPr lang="x-none" dirty="0"/>
               <a:t>number 2: 0.8214289931302869 -0.46291829370832854 -0.3331081845213845</a:t>
             </a:r>
           </a:p>
           <a:p>
             <a:r>
-              <a:rPr lang="en-NL" dirty="0"/>
+              <a:rPr lang="x-none" dirty="0"/>
               <a:t>number 3: -0.07717944023466546 -0.6689391153736788 0.7392995292357111</a:t>
             </a:r>
           </a:p>
@@ -4825,7 +4826,7 @@
           <p:cNvPr id="2" name="Rectangle 1">
             <a:extLst>
               <a:ext uri="{FF2B5EF4-FFF2-40B4-BE49-F238E27FC236}">
-                <a16:creationId xmlns:a16="http://schemas.microsoft.com/office/drawing/2014/main" id="{9AB7D132-E3E3-4CFF-80F3-DC379BA4B8FE}"/>
+                <a16:creationId xmlns:a16="http://schemas.microsoft.com/office/drawing/2014/main" xmlns="" id="{9AB7D132-E3E3-4CFF-80F3-DC379BA4B8FE}"/>
               </a:ext>
             </a:extLst>
           </p:cNvPr>
@@ -4854,109 +4855,109 @@
           </a:p>
           <a:p>
             <a:r>
-              <a:rPr lang="en-NL" dirty="0"/>
+              <a:rPr lang="x-none" dirty="0"/>
               <a:t>[[1.         0.96744203 0.95924812]</a:t>
             </a:r>
           </a:p>
           <a:p>
             <a:r>
-              <a:rPr lang="en-NL" dirty="0"/>
+              <a:rPr lang="x-none" dirty="0"/>
               <a:t> [0.96744203 1.         0.96819833]</a:t>
             </a:r>
           </a:p>
           <a:p>
             <a:r>
-              <a:rPr lang="en-NL" dirty="0"/>
+              <a:rPr lang="x-none" dirty="0"/>
               <a:t> [0.95924812 0.96819833 1.        ]]</a:t>
             </a:r>
           </a:p>
           <a:p>
             <a:r>
-              <a:rPr lang="en-NL" dirty="0"/>
+              <a:rPr lang="x-none" dirty="0"/>
               <a:t>eigenvalues:  [2.92993131+0.j 0.04076847+0.j 0.02930022+0.j]</a:t>
             </a:r>
           </a:p>
           <a:p>
             <a:r>
-              <a:rPr lang="en-NL" dirty="0"/>
+              <a:rPr lang="x-none" dirty="0"/>
               <a:t>Eigenvalue 1 =  2.929931311987825</a:t>
             </a:r>
           </a:p>
           <a:p>
             <a:r>
-              <a:rPr lang="en-NL" dirty="0"/>
+              <a:rPr lang="x-none" dirty="0"/>
               <a:t>Eigenvalue 2 =  0.04076846661638439</a:t>
             </a:r>
           </a:p>
           <a:p>
             <a:r>
-              <a:rPr lang="en-NL" dirty="0"/>
+              <a:rPr lang="x-none" dirty="0"/>
               <a:t>Eigenvalue 3 =  0.029300221395791408</a:t>
             </a:r>
           </a:p>
           <a:p>
             <a:r>
-              <a:rPr lang="en-NL" dirty="0"/>
+              <a:rPr lang="x-none" dirty="0"/>
               <a:t>Variance of total data:</a:t>
             </a:r>
           </a:p>
           <a:p>
             <a:r>
-              <a:rPr lang="en-NL" dirty="0"/>
+              <a:rPr lang="x-none" dirty="0"/>
               <a:t>Eigenvalue 1 =  97.66437706626084</a:t>
             </a:r>
           </a:p>
           <a:p>
             <a:r>
-              <a:rPr lang="en-NL" dirty="0"/>
+              <a:rPr lang="x-none" dirty="0"/>
               <a:t>Eigenvalue 2 =  1.358948887212813</a:t>
             </a:r>
           </a:p>
           <a:p>
             <a:r>
-              <a:rPr lang="en-NL" dirty="0"/>
+              <a:rPr lang="x-none" dirty="0"/>
               <a:t>Eigenvalue 3 =  0.9766740465263802</a:t>
             </a:r>
           </a:p>
           <a:p>
             <a:r>
-              <a:rPr lang="en-NL" dirty="0"/>
+              <a:rPr lang="x-none" dirty="0"/>
               <a:t>eigenvectors: </a:t>
             </a:r>
           </a:p>
           <a:p>
             <a:r>
-              <a:rPr lang="en-NL" dirty="0"/>
+              <a:rPr lang="x-none" dirty="0"/>
               <a:t>[[-0.57670524 -0.72222661  0.38183737]</a:t>
             </a:r>
           </a:p>
           <a:p>
             <a:r>
-              <a:rPr lang="en-NL" dirty="0"/>
+              <a:rPr lang="x-none" dirty="0"/>
               <a:t> [-0.5784872   0.03098743 -0.81510266]</a:t>
             </a:r>
           </a:p>
           <a:p>
             <a:r>
-              <a:rPr lang="en-NL" dirty="0"/>
+              <a:rPr lang="x-none" dirty="0"/>
               <a:t> [-0.57685667  0.69096201  0.43566946]]</a:t>
             </a:r>
           </a:p>
           <a:p>
             <a:r>
-              <a:rPr lang="en-NL" dirty="0"/>
+              <a:rPr lang="x-none" dirty="0"/>
               <a:t>number 1: -0.5767052431704728 -0.5784871988297967 -0.5768566748246406</a:t>
             </a:r>
           </a:p>
           <a:p>
             <a:r>
-              <a:rPr lang="en-NL" dirty="0"/>
+              <a:rPr lang="x-none" dirty="0"/>
               <a:t>number 2: -0.7222266147466163 0.030987425819239345 0.6909620079228234</a:t>
             </a:r>
           </a:p>
           <a:p>
             <a:r>
-              <a:rPr lang="en-NL" dirty="0"/>
+              <a:rPr lang="x-none" dirty="0"/>
               <a:t>number 3: 0.3818373730416173 -0.8151026562532794 0.435669462227415</a:t>
             </a:r>
           </a:p>
@@ -5009,7 +5010,7 @@
           <p:cNvPr id="2" name="Rectangle 1">
             <a:extLst>
               <a:ext uri="{FF2B5EF4-FFF2-40B4-BE49-F238E27FC236}">
-                <a16:creationId xmlns:a16="http://schemas.microsoft.com/office/drawing/2014/main" id="{A969AED3-5A09-440D-BBAA-0541063F26EC}"/>
+                <a16:creationId xmlns:a16="http://schemas.microsoft.com/office/drawing/2014/main" xmlns="" id="{A969AED3-5A09-440D-BBAA-0541063F26EC}"/>
               </a:ext>
             </a:extLst>
           </p:cNvPr>
@@ -5046,109 +5047,109 @@
           </a:p>
           <a:p>
             <a:r>
-              <a:rPr lang="en-NL" dirty="0"/>
+              <a:rPr lang="x-none" dirty="0"/>
               <a:t>[[1.         0.87833401 0.99169127]</a:t>
             </a:r>
           </a:p>
           <a:p>
             <a:r>
-              <a:rPr lang="en-NL" dirty="0"/>
+              <a:rPr lang="x-none" dirty="0"/>
               <a:t> [0.87833401 1.         0.87540947]</a:t>
             </a:r>
           </a:p>
           <a:p>
             <a:r>
-              <a:rPr lang="en-NL" dirty="0"/>
+              <a:rPr lang="x-none" dirty="0"/>
               <a:t> [0.99169127 0.87540947 1.        ]]</a:t>
             </a:r>
           </a:p>
           <a:p>
             <a:r>
-              <a:rPr lang="en-NL" dirty="0"/>
+              <a:rPr lang="x-none" dirty="0"/>
               <a:t>eigenvalues:  [2.83138757+0.j 0.00828897+0.j 0.16032346+0.j]</a:t>
             </a:r>
           </a:p>
           <a:p>
             <a:r>
-              <a:rPr lang="en-NL" dirty="0"/>
+              <a:rPr lang="x-none" dirty="0"/>
               <a:t>Eigenvalue 1 =  2.8313875658218937</a:t>
             </a:r>
           </a:p>
           <a:p>
             <a:r>
-              <a:rPr lang="en-NL" dirty="0"/>
+              <a:rPr lang="x-none" dirty="0"/>
               <a:t>Eigenvalue 2 =  0.16032346392847416</a:t>
             </a:r>
           </a:p>
           <a:p>
             <a:r>
-              <a:rPr lang="en-NL" dirty="0"/>
+              <a:rPr lang="x-none" dirty="0"/>
               <a:t>Eigenvalue 3 =  0.008288970249631876</a:t>
             </a:r>
           </a:p>
           <a:p>
             <a:r>
-              <a:rPr lang="en-NL" dirty="0"/>
+              <a:rPr lang="x-none" dirty="0"/>
               <a:t>Variance of total data:</a:t>
             </a:r>
           </a:p>
           <a:p>
             <a:r>
-              <a:rPr lang="en-NL" dirty="0"/>
+              <a:rPr lang="x-none" dirty="0"/>
               <a:t>Eigenvalue 1 =  94.37958552739646</a:t>
             </a:r>
           </a:p>
           <a:p>
             <a:r>
-              <a:rPr lang="en-NL" dirty="0"/>
+              <a:rPr lang="x-none" dirty="0"/>
               <a:t>Eigenvalue 2 =  5.344115464282472</a:t>
             </a:r>
           </a:p>
           <a:p>
             <a:r>
-              <a:rPr lang="en-NL" dirty="0"/>
+              <a:rPr lang="x-none" dirty="0"/>
               <a:t>Eigenvalue 3 =  0.2762990083210625</a:t>
             </a:r>
           </a:p>
           <a:p>
             <a:r>
-              <a:rPr lang="en-NL" dirty="0"/>
+              <a:rPr lang="x-none" dirty="0"/>
               <a:t>eigenvectors: </a:t>
             </a:r>
           </a:p>
           <a:p>
             <a:r>
-              <a:rPr lang="en-NL" dirty="0"/>
+              <a:rPr lang="x-none" dirty="0"/>
               <a:t>[[-0.58579632 -0.71128698  0.38847587]</a:t>
             </a:r>
           </a:p>
           <a:p>
             <a:r>
-              <a:rPr lang="en-NL" dirty="0"/>
+              <a:rPr lang="x-none" dirty="0"/>
               <a:t> [-0.56068307  0.00955682 -0.82797534]</a:t>
             </a:r>
           </a:p>
           <a:p>
             <a:r>
-              <a:rPr lang="en-NL" dirty="0"/>
+              <a:rPr lang="x-none" dirty="0"/>
               <a:t> [-0.58521549  0.70283675  0.40440492]]</a:t>
             </a:r>
           </a:p>
           <a:p>
             <a:r>
-              <a:rPr lang="en-NL" dirty="0"/>
+              <a:rPr lang="x-none" dirty="0"/>
               <a:t>number 1: -0.5857963198528137 -0.5606830721903274 -0.585215485275395</a:t>
             </a:r>
           </a:p>
           <a:p>
             <a:r>
-              <a:rPr lang="en-NL" dirty="0"/>
+              <a:rPr lang="x-none" dirty="0"/>
               <a:t>number 2: -0.7112869805196672 0.00955681647707408 0.7028367510325838</a:t>
             </a:r>
           </a:p>
           <a:p>
             <a:r>
-              <a:rPr lang="en-NL" dirty="0"/>
+              <a:rPr lang="x-none" dirty="0"/>
               <a:t>number 3: 0.3884758718248986 -0.8279753376870833 0.4044049173685274</a:t>
             </a:r>
           </a:p>
@@ -5171,6 +5172,188 @@
       </p:transition>
     </mc:Choice>
     <mc:Fallback xmlns="">
+      <p:transition spd="med">
+        <p:fade/>
+      </p:transition>
+    </mc:Fallback>
+  </mc:AlternateContent>
+</p:sld>
+</file>
+
+<file path=ppt/slides/slide9.xml><?xml version="1.0" encoding="utf-8"?>
+<p:sld xmlns:a="http://schemas.openxmlformats.org/drawingml/2006/main" xmlns:r="http://schemas.openxmlformats.org/officeDocument/2006/relationships" xmlns:p="http://schemas.openxmlformats.org/presentationml/2006/main">
+  <p:cSld>
+    <p:spTree>
+      <p:nvGrpSpPr>
+        <p:cNvPr id="1" name=""/>
+        <p:cNvGrpSpPr/>
+        <p:nvPr/>
+      </p:nvGrpSpPr>
+      <p:grpSpPr>
+        <a:xfrm>
+          <a:off x="0" y="0"/>
+          <a:ext cx="0" cy="0"/>
+          <a:chOff x="0" y="0"/>
+          <a:chExt cx="0" cy="0"/>
+        </a:xfrm>
+      </p:grpSpPr>
+      <p:sp>
+        <p:nvSpPr>
+          <p:cNvPr id="2" name="Titel 1"/>
+          <p:cNvSpPr>
+            <a:spLocks noGrp="1"/>
+          </p:cNvSpPr>
+          <p:nvPr>
+            <p:ph type="title"/>
+          </p:nvPr>
+        </p:nvSpPr>
+        <p:spPr/>
+        <p:txBody>
+          <a:bodyPr/>
+          <a:lstStyle/>
+          <a:p>
+            <a:r>
+              <a:rPr lang="en-GB" dirty="0" err="1" smtClean="0"/>
+              <a:t>Verschillen</a:t>
+            </a:r>
+            <a:r>
+              <a:rPr lang="en-GB" dirty="0" smtClean="0"/>
+              <a:t> </a:t>
+            </a:r>
+            <a:r>
+              <a:rPr lang="en-GB" dirty="0" err="1" smtClean="0"/>
+              <a:t>tussen</a:t>
+            </a:r>
+            <a:r>
+              <a:rPr lang="en-GB" dirty="0" smtClean="0"/>
+              <a:t> </a:t>
+            </a:r>
+            <a:r>
+              <a:rPr lang="en-GB" dirty="0" err="1" smtClean="0"/>
+              <a:t>meetstations</a:t>
+            </a:r>
+            <a:r>
+              <a:rPr lang="en-GB" dirty="0" smtClean="0"/>
+              <a:t> en hoe </a:t>
+            </a:r>
+            <a:r>
+              <a:rPr lang="en-GB" dirty="0" err="1" smtClean="0"/>
+              <a:t>te</a:t>
+            </a:r>
+            <a:r>
+              <a:rPr lang="en-GB" dirty="0" smtClean="0"/>
+              <a:t> </a:t>
+            </a:r>
+            <a:r>
+              <a:rPr lang="en-GB" dirty="0" err="1" smtClean="0"/>
+              <a:t>verklaren</a:t>
+            </a:r>
+            <a:endParaRPr lang="en-GB" dirty="0"/>
+          </a:p>
+        </p:txBody>
+      </p:sp>
+      <p:sp>
+        <p:nvSpPr>
+          <p:cNvPr id="3" name="Tijdelijke aanduiding voor inhoud 2"/>
+          <p:cNvSpPr>
+            <a:spLocks noGrp="1"/>
+          </p:cNvSpPr>
+          <p:nvPr>
+            <p:ph idx="1"/>
+          </p:nvPr>
+        </p:nvSpPr>
+        <p:spPr/>
+        <p:txBody>
+          <a:bodyPr/>
+          <a:lstStyle/>
+          <a:p>
+            <a:r>
+              <a:rPr lang="en-GB" dirty="0" err="1" smtClean="0"/>
+              <a:t>Temperatuur</a:t>
+            </a:r>
+            <a:r>
+              <a:rPr lang="en-GB" dirty="0" smtClean="0"/>
+              <a:t> – </a:t>
+            </a:r>
+            <a:r>
+              <a:rPr lang="en-GB" dirty="0" err="1" smtClean="0"/>
+              <a:t>hoogte</a:t>
+            </a:r>
+            <a:endParaRPr lang="en-GB" dirty="0" smtClean="0"/>
+          </a:p>
+          <a:p>
+            <a:r>
+              <a:rPr lang="en-GB" dirty="0" err="1" smtClean="0"/>
+              <a:t>Mooie</a:t>
+            </a:r>
+            <a:r>
+              <a:rPr lang="en-GB" dirty="0" smtClean="0"/>
+              <a:t> </a:t>
+            </a:r>
+            <a:r>
+              <a:rPr lang="en-GB" dirty="0" err="1" smtClean="0"/>
+              <a:t>plaatjes</a:t>
+            </a:r>
+            <a:r>
+              <a:rPr lang="en-GB" dirty="0" smtClean="0"/>
+              <a:t> – katabatic wind – </a:t>
+            </a:r>
+            <a:r>
+              <a:rPr lang="en-GB" dirty="0" err="1" smtClean="0"/>
+              <a:t>richting</a:t>
+            </a:r>
+            <a:r>
+              <a:rPr lang="en-GB" dirty="0" smtClean="0"/>
+              <a:t> </a:t>
+            </a:r>
+            <a:r>
+              <a:rPr lang="en-GB" dirty="0" err="1" smtClean="0"/>
+              <a:t>gletsjer</a:t>
+            </a:r>
+            <a:endParaRPr lang="en-GB" dirty="0" smtClean="0"/>
+          </a:p>
+          <a:p>
+            <a:r>
+              <a:rPr lang="en-GB" dirty="0" err="1" smtClean="0"/>
+              <a:t>Sneewhoogte</a:t>
+            </a:r>
+            <a:r>
+              <a:rPr lang="en-GB" dirty="0" smtClean="0"/>
+              <a:t> en </a:t>
+            </a:r>
+            <a:r>
+              <a:rPr lang="en-GB" dirty="0" err="1" smtClean="0"/>
+              <a:t>straling</a:t>
+            </a:r>
+            <a:r>
+              <a:rPr lang="en-GB" dirty="0" smtClean="0"/>
+              <a:t> - </a:t>
+            </a:r>
+            <a:r>
+              <a:rPr lang="en-GB" dirty="0" err="1" smtClean="0"/>
+              <a:t>hoogte</a:t>
+            </a:r>
+            <a:endParaRPr lang="en-GB" dirty="0"/>
+          </a:p>
+        </p:txBody>
+      </p:sp>
+    </p:spTree>
+    <p:extLst>
+      <p:ext uri="{BB962C8B-B14F-4D97-AF65-F5344CB8AC3E}">
+        <p14:creationId xmlns:p14="http://schemas.microsoft.com/office/powerpoint/2010/main" val="1878178011"/>
+      </p:ext>
+    </p:extLst>
+  </p:cSld>
+  <p:clrMapOvr>
+    <a:masterClrMapping/>
+  </p:clrMapOvr>
+  <mc:AlternateContent xmlns:mc="http://schemas.openxmlformats.org/markup-compatibility/2006">
+    <mc:Choice xmlns:p14="http://schemas.microsoft.com/office/powerpoint/2010/main" Requires="p14">
+      <p:transition spd="med" p14:dur="700">
+        <p:fade/>
+      </p:transition>
+    </mc:Choice>
+    <mc:Fallback>
       <p:transition spd="med">
         <p:fade/>
       </p:transition>
@@ -5984,17 +6167,6 @@
 </file>
 
 <file path=customXml/item2.xml><?xml version="1.0" encoding="utf-8"?>
-<p:properties xmlns:p="http://schemas.microsoft.com/office/2006/metadata/properties" xmlns:xsi="http://www.w3.org/2001/XMLSchema-instance" xmlns:pc="http://schemas.microsoft.com/office/infopath/2007/PartnerControls">
-  <documentManagement>
-    <VSO_x0020_item_x0020_id xmlns="40262f94-9f35-4ac3-9a90-690165a166b7" xsi:nil="true"/>
-    <Assetid_x0020_ xmlns="40262f94-9f35-4ac3-9a90-690165a166b7" xsi:nil="true"/>
-    <Item_x0020_Details xmlns="40262f94-9f35-4ac3-9a90-690165a166b7" xsi:nil="true"/>
-    <Template_x0020_details xmlns="40262f94-9f35-4ac3-9a90-690165a166b7" xsi:nil="true"/>
-  </documentManagement>
-</p:properties>
-</file>
-
-<file path=customXml/item3.xml><?xml version="1.0" encoding="utf-8"?>
 <ct:contentTypeSchema xmlns:ct="http://schemas.microsoft.com/office/2006/metadata/contentType" xmlns:ma="http://schemas.microsoft.com/office/2006/metadata/properties/metaAttributes" ct:_="" ma:_="" ma:contentTypeName="Document" ma:contentTypeID="0x010100AA3F7D94069FF64A86F7DFF56D60E3BE" ma:contentTypeVersion="6" ma:contentTypeDescription="Create a new document." ma:contentTypeScope="" ma:versionID="c32302c77d4085ecf495bdddb7f5e889">
   <xsd:schema xmlns:xsd="http://www.w3.org/2001/XMLSchema" xmlns:xs="http://www.w3.org/2001/XMLSchema" xmlns:p="http://schemas.microsoft.com/office/2006/metadata/properties" xmlns:ns2="a4f35948-e619-41b3-aa29-22878b09cfd2" xmlns:ns3="40262f94-9f35-4ac3-9a90-690165a166b7" targetNamespace="http://schemas.microsoft.com/office/2006/metadata/properties" ma:root="true" ma:fieldsID="4ab5ae46be95f9d0be6107e8200be7a2" ns2:_="" ns3:_="">
     <xsd:import namespace="a4f35948-e619-41b3-aa29-22878b09cfd2"/>
@@ -6175,6 +6347,17 @@
 </ct:contentTypeSchema>
 </file>
 
+<file path=customXml/item3.xml><?xml version="1.0" encoding="utf-8"?>
+<p:properties xmlns:p="http://schemas.microsoft.com/office/2006/metadata/properties" xmlns:xsi="http://www.w3.org/2001/XMLSchema-instance" xmlns:pc="http://schemas.microsoft.com/office/infopath/2007/PartnerControls">
+  <documentManagement>
+    <VSO_x0020_item_x0020_id xmlns="40262f94-9f35-4ac3-9a90-690165a166b7" xsi:nil="true"/>
+    <Assetid_x0020_ xmlns="40262f94-9f35-4ac3-9a90-690165a166b7" xsi:nil="true"/>
+    <Item_x0020_Details xmlns="40262f94-9f35-4ac3-9a90-690165a166b7" xsi:nil="true"/>
+    <Template_x0020_details xmlns="40262f94-9f35-4ac3-9a90-690165a166b7" xsi:nil="true"/>
+  </documentManagement>
+</p:properties>
+</file>
+
 <file path=customXml/itemProps1.xml><?xml version="1.0" encoding="utf-8"?>
 <ds:datastoreItem xmlns:ds="http://schemas.openxmlformats.org/officeDocument/2006/customXml" ds:itemID="{3E783485-1103-4BBC-98A1-D39A248154C3}">
   <ds:schemaRefs>
@@ -6184,23 +6367,6 @@
 </file>
 
 <file path=customXml/itemProps2.xml><?xml version="1.0" encoding="utf-8"?>
-<ds:datastoreItem xmlns:ds="http://schemas.openxmlformats.org/officeDocument/2006/customXml" ds:itemID="{2915ED37-D514-41C3-9B3C-B262145D17B7}">
-  <ds:schemaRefs>
-    <ds:schemaRef ds:uri="http://schemas.microsoft.com/office/2006/documentManagement/types"/>
-    <ds:schemaRef ds:uri="http://schemas.microsoft.com/office/infopath/2007/PartnerControls"/>
-    <ds:schemaRef ds:uri="http://purl.org/dc/elements/1.1/"/>
-    <ds:schemaRef ds:uri="http://schemas.microsoft.com/office/2006/metadata/properties"/>
-    <ds:schemaRef ds:uri="http://purl.org/dc/terms/"/>
-    <ds:schemaRef ds:uri="http://schemas.openxmlformats.org/package/2006/metadata/core-properties"/>
-    <ds:schemaRef ds:uri="40262f94-9f35-4ac3-9a90-690165a166b7"/>
-    <ds:schemaRef ds:uri="a4f35948-e619-41b3-aa29-22878b09cfd2"/>
-    <ds:schemaRef ds:uri="http://www.w3.org/XML/1998/namespace"/>
-    <ds:schemaRef ds:uri="http://purl.org/dc/dcmitype/"/>
-  </ds:schemaRefs>
-</ds:datastoreItem>
-</file>
-
-<file path=customXml/itemProps3.xml><?xml version="1.0" encoding="utf-8"?>
 <ds:datastoreItem xmlns:ds="http://schemas.openxmlformats.org/officeDocument/2006/customXml" ds:itemID="{D8853CD7-B1C6-4FDD-B6D0-92A83B857D3F}">
   <ds:schemaRefs>
     <ds:schemaRef ds:uri="http://schemas.microsoft.com/office/2006/metadata/contentType"/>
@@ -6217,4 +6383,21 @@
     <ds:schemaRef ds:uri="http://schemas.microsoft.com/internal/obd"/>
   </ds:schemaRefs>
 </ds:datastoreItem>
+</file>
+
+<file path=customXml/itemProps3.xml><?xml version="1.0" encoding="utf-8"?>
+<ds:datastoreItem xmlns:ds="http://schemas.openxmlformats.org/officeDocument/2006/customXml" ds:itemID="{2915ED37-D514-41C3-9B3C-B262145D17B7}">
+  <ds:schemaRefs>
+    <ds:schemaRef ds:uri="http://schemas.microsoft.com/office/2006/documentManagement/types"/>
+    <ds:schemaRef ds:uri="http://schemas.microsoft.com/office/infopath/2007/PartnerControls"/>
+    <ds:schemaRef ds:uri="http://purl.org/dc/elements/1.1/"/>
+    <ds:schemaRef ds:uri="http://schemas.microsoft.com/office/2006/metadata/properties"/>
+    <ds:schemaRef ds:uri="http://purl.org/dc/terms/"/>
+    <ds:schemaRef ds:uri="http://schemas.openxmlformats.org/package/2006/metadata/core-properties"/>
+    <ds:schemaRef ds:uri="40262f94-9f35-4ac3-9a90-690165a166b7"/>
+    <ds:schemaRef ds:uri="a4f35948-e619-41b3-aa29-22878b09cfd2"/>
+    <ds:schemaRef ds:uri="http://www.w3.org/XML/1998/namespace"/>
+    <ds:schemaRef ds:uri="http://purl.org/dc/dcmitype/"/>
+  </ds:schemaRefs>
+</ds:datastoreItem>
 </file>
</xml_diff>